<commit_message>
updated presentation with GitHub links
</commit_message>
<xml_diff>
--- a/Documents/Design Patterns Presentation.pptx
+++ b/Documents/Design Patterns Presentation.pptx
@@ -21,9 +21,10 @@
     <p:sldId id="290" r:id="rId15"/>
     <p:sldId id="270" r:id="rId16"/>
     <p:sldId id="283" r:id="rId17"/>
-    <p:sldId id="284" r:id="rId18"/>
-    <p:sldId id="281" r:id="rId19"/>
-    <p:sldId id="280" r:id="rId20"/>
+    <p:sldId id="291" r:id="rId18"/>
+    <p:sldId id="284" r:id="rId19"/>
+    <p:sldId id="281" r:id="rId20"/>
+    <p:sldId id="280" r:id="rId21"/>
   </p:sldIdLst>
   <p:sldSz cx="9144000" cy="5143500" type="screen16x9"/>
   <p:notesSz cx="6858000" cy="9144000"/>
@@ -6984,8 +6985,8 @@
           <a:lstStyle/>
           <a:p>
             <a:r>
-              <a:rPr lang="en-US" dirty="0"/>
-              <a:t>Part1 – Implement Library main engine</a:t>
+              <a:rPr lang="en-CA" dirty="0"/>
+              <a:t>Instructions</a:t>
             </a:r>
           </a:p>
         </p:txBody>
@@ -7006,48 +7007,42 @@
           <a:lstStyle/>
           <a:p>
             <a:r>
-              <a:rPr lang="en-US" dirty="0"/>
-              <a:t>Given:</a:t>
-            </a:r>
-          </a:p>
-          <a:p>
-            <a:pPr lvl="1"/>
-            <a:r>
-              <a:rPr lang="en-US" dirty="0"/>
-              <a:t>main method which starts Library application</a:t>
-            </a:r>
-          </a:p>
-          <a:p>
-            <a:r>
-              <a:rPr lang="en-US" dirty="0"/>
-              <a:t>Task:</a:t>
-            </a:r>
-          </a:p>
-          <a:p>
-            <a:pPr lvl="1"/>
-            <a:r>
-              <a:rPr lang="en-US" dirty="0"/>
-              <a:t>Using </a:t>
-            </a:r>
-            <a:r>
-              <a:rPr lang="en-US" b="1" dirty="0">
-                <a:solidFill>
-                  <a:srgbClr val="FF0000"/>
-                </a:solidFill>
+              <a:rPr lang="en-CA" dirty="0"/>
+              <a:t>Clone the Exercise project from </a:t>
+            </a:r>
+            <a:r>
+              <a:rPr lang="en-CA" dirty="0">
+                <a:hlinkClick r:id="rId2"/>
               </a:rPr>
-              <a:t>Singleton</a:t>
-            </a:r>
-            <a:r>
-              <a:rPr lang="en-US" dirty="0"/>
-              <a:t> pattern make sure the system will always run only one instance of library </a:t>
-            </a:r>
+              <a:t>https://github.com/VarianDeveloper/Jan2017_DesignPatternsTraining.git</a:t>
+            </a:r>
+            <a:endParaRPr lang="en-CA" dirty="0"/>
+          </a:p>
+          <a:p>
+            <a:r>
+              <a:rPr lang="en-CA" dirty="0"/>
+              <a:t>For GitHub Quick start refer to </a:t>
+            </a:r>
+            <a:r>
+              <a:rPr lang="en-CA" dirty="0">
+                <a:hlinkClick r:id="rId3"/>
+              </a:rPr>
+              <a:t>https://github.com/VarianDeveloper/Jan2017_DesignPatternsTraining/blob/master/Documents/GitHubQuickStart.docx</a:t>
+            </a:r>
+            <a:endParaRPr lang="en-CA" dirty="0"/>
+          </a:p>
+          <a:p>
+            <a:pPr marL="0" indent="0">
+              <a:buNone/>
+            </a:pPr>
+            <a:endParaRPr lang="en-CA" dirty="0"/>
           </a:p>
         </p:txBody>
       </p:sp>
     </p:spTree>
     <p:extLst>
       <p:ext uri="{BB962C8B-B14F-4D97-AF65-F5344CB8AC3E}">
-        <p14:creationId xmlns:p14="http://schemas.microsoft.com/office/powerpoint/2010/main" val="4002076103"/>
+        <p14:creationId xmlns:p14="http://schemas.microsoft.com/office/powerpoint/2010/main" val="3710923637"/>
       </p:ext>
     </p:extLst>
   </p:cSld>
@@ -7084,19 +7079,14 @@
             <p:ph type="title"/>
           </p:nvPr>
         </p:nvSpPr>
-        <p:spPr>
-          <a:xfrm>
-            <a:off x="232348" y="88106"/>
-            <a:ext cx="8731770" cy="857250"/>
-          </a:xfrm>
-        </p:spPr>
+        <p:spPr/>
         <p:txBody>
           <a:bodyPr/>
           <a:lstStyle/>
           <a:p>
             <a:r>
               <a:rPr lang="en-US" dirty="0"/>
-              <a:t>Part2 - Implement part of a library registration system</a:t>
+              <a:t>Part1 – Implement Library main engine</a:t>
             </a:r>
           </a:p>
         </p:txBody>
@@ -7118,61 +7108,26 @@
           <a:p>
             <a:r>
               <a:rPr lang="en-US" dirty="0"/>
-              <a:t>Given: </a:t>
+              <a:t>Given:</a:t>
             </a:r>
           </a:p>
           <a:p>
             <a:pPr lvl="1"/>
             <a:r>
               <a:rPr lang="en-US" dirty="0"/>
-              <a:t>Book class extending </a:t>
-            </a:r>
-            <a:r>
-              <a:rPr lang="en-US" dirty="0" err="1"/>
-              <a:t>LibItem</a:t>
-            </a:r>
-            <a:r>
-              <a:rPr lang="en-US" dirty="0"/>
-              <a:t> abstract class</a:t>
+              <a:t>main method which starts Library application</a:t>
+            </a:r>
+          </a:p>
+          <a:p>
+            <a:r>
+              <a:rPr lang="en-US" dirty="0"/>
+              <a:t>Task:</a:t>
             </a:r>
           </a:p>
           <a:p>
             <a:pPr lvl="1"/>
             <a:r>
               <a:rPr lang="en-US" dirty="0"/>
-              <a:t>Video class extending </a:t>
-            </a:r>
-            <a:r>
-              <a:rPr lang="en-US" dirty="0" err="1"/>
-              <a:t>LibItem</a:t>
-            </a:r>
-            <a:r>
-              <a:rPr lang="en-US" dirty="0"/>
-              <a:t> </a:t>
-            </a:r>
-            <a:r>
-              <a:rPr lang="en-US"/>
-              <a:t>abstract class</a:t>
-            </a:r>
-            <a:endParaRPr lang="en-US" dirty="0"/>
-          </a:p>
-          <a:p>
-            <a:pPr lvl="1"/>
-            <a:r>
-              <a:rPr lang="en-US" dirty="0"/>
-              <a:t>Customer class extending Person abstract class </a:t>
-            </a:r>
-          </a:p>
-          <a:p>
-            <a:r>
-              <a:rPr lang="en-US" dirty="0"/>
-              <a:t>Task:</a:t>
-            </a:r>
-          </a:p>
-          <a:p>
-            <a:pPr lvl="1"/>
-            <a:r>
-              <a:rPr lang="en-US" dirty="0"/>
               <a:t>Using </a:t>
             </a:r>
             <a:r>
@@ -7181,22 +7136,19 @@
                   <a:srgbClr val="FF0000"/>
                 </a:solidFill>
               </a:rPr>
-              <a:t>Bridge</a:t>
-            </a:r>
-            <a:r>
-              <a:rPr lang="en-US" dirty="0"/>
-              <a:t> pattern implement Registration class that adds new book, video or customer to the library.</a:t>
-            </a:r>
-          </a:p>
-          <a:p>
-            <a:endParaRPr lang="en-US" dirty="0"/>
+              <a:t>Singleton</a:t>
+            </a:r>
+            <a:r>
+              <a:rPr lang="en-US" dirty="0"/>
+              <a:t> pattern make sure the system will always run only one instance of library </a:t>
+            </a:r>
           </a:p>
         </p:txBody>
       </p:sp>
     </p:spTree>
     <p:extLst>
       <p:ext uri="{BB962C8B-B14F-4D97-AF65-F5344CB8AC3E}">
-        <p14:creationId xmlns:p14="http://schemas.microsoft.com/office/powerpoint/2010/main" val="1524493106"/>
+        <p14:creationId xmlns:p14="http://schemas.microsoft.com/office/powerpoint/2010/main" val="4002076103"/>
       </p:ext>
     </p:extLst>
   </p:cSld>
@@ -7233,6 +7185,33 @@
             <p:ph type="title"/>
           </p:nvPr>
         </p:nvSpPr>
+        <p:spPr>
+          <a:xfrm>
+            <a:off x="232348" y="88106"/>
+            <a:ext cx="8731770" cy="857250"/>
+          </a:xfrm>
+        </p:spPr>
+        <p:txBody>
+          <a:bodyPr/>
+          <a:lstStyle/>
+          <a:p>
+            <a:r>
+              <a:rPr lang="en-US" dirty="0"/>
+              <a:t>Part2 - Implement part of a library registration system</a:t>
+            </a:r>
+          </a:p>
+        </p:txBody>
+      </p:sp>
+      <p:sp>
+        <p:nvSpPr>
+          <p:cNvPr id="3" name="Text Placeholder 2"/>
+          <p:cNvSpPr>
+            <a:spLocks noGrp="1"/>
+          </p:cNvSpPr>
+          <p:nvPr>
+            <p:ph type="body" sz="quarter" idx="10"/>
+          </p:nvPr>
+        </p:nvSpPr>
         <p:spPr/>
         <p:txBody>
           <a:bodyPr/>
@@ -7240,28 +7219,6 @@
           <a:p>
             <a:r>
               <a:rPr lang="en-US" dirty="0"/>
-              <a:t>Part3 - Implement part of a library tracking system</a:t>
-            </a:r>
-          </a:p>
-        </p:txBody>
-      </p:sp>
-      <p:sp>
-        <p:nvSpPr>
-          <p:cNvPr id="3" name="Text Placeholder 2"/>
-          <p:cNvSpPr>
-            <a:spLocks noGrp="1"/>
-          </p:cNvSpPr>
-          <p:nvPr>
-            <p:ph type="body" sz="quarter" idx="10"/>
-          </p:nvPr>
-        </p:nvSpPr>
-        <p:spPr/>
-        <p:txBody>
-          <a:bodyPr/>
-          <a:lstStyle/>
-          <a:p>
-            <a:r>
-              <a:rPr lang="en-US" dirty="0"/>
               <a:t>Given: </a:t>
             </a:r>
           </a:p>
@@ -7269,14 +7226,42 @@
             <a:pPr lvl="1"/>
             <a:r>
               <a:rPr lang="en-US" dirty="0"/>
-              <a:t>Book class extending LibItem class</a:t>
+              <a:t>Book class extending </a:t>
+            </a:r>
+            <a:r>
+              <a:rPr lang="en-US" dirty="0" err="1"/>
+              <a:t>LibItem</a:t>
+            </a:r>
+            <a:r>
+              <a:rPr lang="en-US" dirty="0"/>
+              <a:t> abstract class</a:t>
             </a:r>
           </a:p>
           <a:p>
             <a:pPr lvl="1"/>
             <a:r>
               <a:rPr lang="en-US" dirty="0"/>
-              <a:t>Video class extending LibItem class</a:t>
+              <a:t>Video class extending </a:t>
+            </a:r>
+            <a:r>
+              <a:rPr lang="en-US" dirty="0" err="1"/>
+              <a:t>LibItem</a:t>
+            </a:r>
+            <a:r>
+              <a:rPr lang="en-US" dirty="0"/>
+              <a:t> </a:t>
+            </a:r>
+            <a:r>
+              <a:rPr lang="en-US"/>
+              <a:t>abstract class</a:t>
+            </a:r>
+            <a:endParaRPr lang="en-US" dirty="0"/>
+          </a:p>
+          <a:p>
+            <a:pPr lvl="1"/>
+            <a:r>
+              <a:rPr lang="en-US" dirty="0"/>
+              <a:t>Customer class extending Person abstract class </a:t>
             </a:r>
           </a:p>
           <a:p>
@@ -7297,19 +7282,11 @@
                   <a:srgbClr val="FF0000"/>
                 </a:solidFill>
               </a:rPr>
-              <a:t>Decorator</a:t>
-            </a:r>
-            <a:r>
-              <a:rPr lang="en-US" dirty="0"/>
-              <a:t> pattern implement </a:t>
-            </a:r>
-            <a:r>
-              <a:rPr lang="en-US" dirty="0" err="1"/>
-              <a:t>BookBorrowable</a:t>
-            </a:r>
-            <a:r>
-              <a:rPr lang="en-US" dirty="0"/>
-              <a:t> class that enables to borrow a book from the library.</a:t>
+              <a:t>Bridge</a:t>
+            </a:r>
+            <a:r>
+              <a:rPr lang="en-US" dirty="0"/>
+              <a:t> pattern implement Registration class that adds new book, video or customer to the library.</a:t>
             </a:r>
           </a:p>
           <a:p>
@@ -7320,7 +7297,7 @@
     </p:spTree>
     <p:extLst>
       <p:ext uri="{BB962C8B-B14F-4D97-AF65-F5344CB8AC3E}">
-        <p14:creationId xmlns:p14="http://schemas.microsoft.com/office/powerpoint/2010/main" val="404622422"/>
+        <p14:creationId xmlns:p14="http://schemas.microsoft.com/office/powerpoint/2010/main" val="1524493106"/>
       </p:ext>
     </p:extLst>
   </p:cSld>
@@ -7407,6 +7384,130 @@
     <p:extLst>
       <p:ext uri="{BB962C8B-B14F-4D97-AF65-F5344CB8AC3E}">
         <p14:creationId xmlns:p14="http://schemas.microsoft.com/office/powerpoint/2010/main" val="3049549341"/>
+      </p:ext>
+    </p:extLst>
+  </p:cSld>
+  <p:clrMapOvr>
+    <a:masterClrMapping/>
+  </p:clrMapOvr>
+</p:sld>
+</file>
+
+<file path=ppt/slides/slide20.xml><?xml version="1.0" encoding="utf-8"?>
+<p:sld xmlns:a="http://schemas.openxmlformats.org/drawingml/2006/main" xmlns:r="http://schemas.openxmlformats.org/officeDocument/2006/relationships" xmlns:p="http://schemas.openxmlformats.org/presentationml/2006/main">
+  <p:cSld>
+    <p:spTree>
+      <p:nvGrpSpPr>
+        <p:cNvPr id="1" name=""/>
+        <p:cNvGrpSpPr/>
+        <p:nvPr/>
+      </p:nvGrpSpPr>
+      <p:grpSpPr>
+        <a:xfrm>
+          <a:off x="0" y="0"/>
+          <a:ext cx="0" cy="0"/>
+          <a:chOff x="0" y="0"/>
+          <a:chExt cx="0" cy="0"/>
+        </a:xfrm>
+      </p:grpSpPr>
+      <p:sp>
+        <p:nvSpPr>
+          <p:cNvPr id="2" name="Title 1"/>
+          <p:cNvSpPr>
+            <a:spLocks noGrp="1"/>
+          </p:cNvSpPr>
+          <p:nvPr>
+            <p:ph type="title"/>
+          </p:nvPr>
+        </p:nvSpPr>
+        <p:spPr/>
+        <p:txBody>
+          <a:bodyPr/>
+          <a:lstStyle/>
+          <a:p>
+            <a:r>
+              <a:rPr lang="en-US" dirty="0"/>
+              <a:t>Part3 - Implement part of a library tracking system</a:t>
+            </a:r>
+          </a:p>
+        </p:txBody>
+      </p:sp>
+      <p:sp>
+        <p:nvSpPr>
+          <p:cNvPr id="3" name="Text Placeholder 2"/>
+          <p:cNvSpPr>
+            <a:spLocks noGrp="1"/>
+          </p:cNvSpPr>
+          <p:nvPr>
+            <p:ph type="body" sz="quarter" idx="10"/>
+          </p:nvPr>
+        </p:nvSpPr>
+        <p:spPr/>
+        <p:txBody>
+          <a:bodyPr/>
+          <a:lstStyle/>
+          <a:p>
+            <a:r>
+              <a:rPr lang="en-US" dirty="0"/>
+              <a:t>Given: </a:t>
+            </a:r>
+          </a:p>
+          <a:p>
+            <a:pPr lvl="1"/>
+            <a:r>
+              <a:rPr lang="en-US" dirty="0"/>
+              <a:t>Book class extending LibItem class</a:t>
+            </a:r>
+          </a:p>
+          <a:p>
+            <a:pPr lvl="1"/>
+            <a:r>
+              <a:rPr lang="en-US" dirty="0"/>
+              <a:t>Video class extending LibItem class</a:t>
+            </a:r>
+          </a:p>
+          <a:p>
+            <a:r>
+              <a:rPr lang="en-US" dirty="0"/>
+              <a:t>Task:</a:t>
+            </a:r>
+          </a:p>
+          <a:p>
+            <a:pPr lvl="1"/>
+            <a:r>
+              <a:rPr lang="en-US" dirty="0"/>
+              <a:t>Using </a:t>
+            </a:r>
+            <a:r>
+              <a:rPr lang="en-US" b="1" dirty="0">
+                <a:solidFill>
+                  <a:srgbClr val="FF0000"/>
+                </a:solidFill>
+              </a:rPr>
+              <a:t>Decorator</a:t>
+            </a:r>
+            <a:r>
+              <a:rPr lang="en-US" dirty="0"/>
+              <a:t> pattern implement </a:t>
+            </a:r>
+            <a:r>
+              <a:rPr lang="en-US" dirty="0" err="1"/>
+              <a:t>BookBorrowable</a:t>
+            </a:r>
+            <a:r>
+              <a:rPr lang="en-US" dirty="0"/>
+              <a:t> class that enables to borrow a book from the library.</a:t>
+            </a:r>
+          </a:p>
+          <a:p>
+            <a:endParaRPr lang="en-US" dirty="0"/>
+          </a:p>
+        </p:txBody>
+      </p:sp>
+    </p:spTree>
+    <p:extLst>
+      <p:ext uri="{BB962C8B-B14F-4D97-AF65-F5344CB8AC3E}">
+        <p14:creationId xmlns:p14="http://schemas.microsoft.com/office/powerpoint/2010/main" val="404622422"/>
       </p:ext>
     </p:extLst>
   </p:cSld>

</xml_diff>